<commit_message>
updated issues details for metric servers
</commit_message>
<xml_diff>
--- a/Day35/DockerAndKubernetes_Training-Day35.pptx
+++ b/Day35/DockerAndKubernetes_Training-Day35.pptx
@@ -5,12 +5,15 @@
     <p:sldMasterId id="2147483880" r:id="rId1"/>
   </p:sldMasterIdLst>
   <p:notesMasterIdLst>
-    <p:notesMasterId r:id="rId5"/>
+    <p:notesMasterId r:id="rId8"/>
   </p:notesMasterIdLst>
   <p:sldIdLst>
     <p:sldId id="439" r:id="rId2"/>
     <p:sldId id="449" r:id="rId3"/>
-    <p:sldId id="451" r:id="rId4"/>
+    <p:sldId id="452" r:id="rId4"/>
+    <p:sldId id="453" r:id="rId5"/>
+    <p:sldId id="454" r:id="rId6"/>
+    <p:sldId id="451" r:id="rId7"/>
   </p:sldIdLst>
   <p:sldSz cx="12192000" cy="6858000"/>
   <p:notesSz cx="6858000" cy="9144000"/>
@@ -14101,6 +14104,1051 @@
 </file>
 
 <file path=ppt/slides/slide3.xml><?xml version="1.0" encoding="utf-8"?>
+<p:sld xmlns:a="http://schemas.openxmlformats.org/drawingml/2006/main" xmlns:r="http://schemas.openxmlformats.org/officeDocument/2006/relationships" xmlns:p="http://schemas.openxmlformats.org/presentationml/2006/main">
+  <p:cSld>
+    <p:spTree>
+      <p:nvGrpSpPr>
+        <p:cNvPr id="1" name=""/>
+        <p:cNvGrpSpPr/>
+        <p:nvPr/>
+      </p:nvGrpSpPr>
+      <p:grpSpPr>
+        <a:xfrm>
+          <a:off x="0" y="0"/>
+          <a:ext cx="0" cy="0"/>
+          <a:chOff x="0" y="0"/>
+          <a:chExt cx="0" cy="0"/>
+        </a:xfrm>
+      </p:grpSpPr>
+      <p:sp>
+        <p:nvSpPr>
+          <p:cNvPr id="2" name="Title 1">
+            <a:extLst>
+              <a:ext uri="{FF2B5EF4-FFF2-40B4-BE49-F238E27FC236}">
+                <a16:creationId xmlns:a16="http://schemas.microsoft.com/office/drawing/2014/main" id="{E56F869C-A1E7-4989-E938-BA5DE46D1FD1}"/>
+              </a:ext>
+            </a:extLst>
+          </p:cNvPr>
+          <p:cNvSpPr>
+            <a:spLocks noGrp="1"/>
+          </p:cNvSpPr>
+          <p:nvPr>
+            <p:ph type="title"/>
+          </p:nvPr>
+        </p:nvSpPr>
+        <p:spPr>
+          <a:xfrm>
+            <a:off x="717453" y="973668"/>
+            <a:ext cx="9198914" cy="706964"/>
+          </a:xfrm>
+        </p:spPr>
+        <p:txBody>
+          <a:bodyPr>
+            <a:normAutofit/>
+          </a:bodyPr>
+          <a:lstStyle/>
+          <a:p>
+            <a:r>
+              <a:rPr lang="en-US" dirty="0"/>
+              <a:t>Horizontal Pod AutoScaler – Key Pointers</a:t>
+            </a:r>
+            <a:endParaRPr lang="en-IN" dirty="0"/>
+          </a:p>
+        </p:txBody>
+      </p:sp>
+      <p:sp>
+        <p:nvSpPr>
+          <p:cNvPr id="3" name="Content Placeholder 2">
+            <a:extLst>
+              <a:ext uri="{FF2B5EF4-FFF2-40B4-BE49-F238E27FC236}">
+                <a16:creationId xmlns:a16="http://schemas.microsoft.com/office/drawing/2014/main" id="{7B137940-CBB4-B117-F716-B9C1515405BD}"/>
+              </a:ext>
+            </a:extLst>
+          </p:cNvPr>
+          <p:cNvSpPr txBox="1">
+            <a:spLocks/>
+          </p:cNvSpPr>
+          <p:nvPr/>
+        </p:nvSpPr>
+        <p:spPr>
+          <a:xfrm>
+            <a:off x="717453" y="2431866"/>
+            <a:ext cx="9411285" cy="3727937"/>
+          </a:xfrm>
+          <a:prstGeom prst="rect">
+            <a:avLst/>
+          </a:prstGeom>
+        </p:spPr>
+        <p:txBody>
+          <a:bodyPr vert="horz" lIns="91440" tIns="45720" rIns="91440" bIns="45720" rtlCol="0">
+            <a:normAutofit/>
+          </a:bodyPr>
+          <a:lstStyle>
+            <a:lvl1pPr marL="342900" indent="-342900" algn="l" defTabSz="457200" rtl="0" eaLnBrk="1" latinLnBrk="0" hangingPunct="1">
+              <a:spcBef>
+                <a:spcPts val="1000"/>
+              </a:spcBef>
+              <a:spcAft>
+                <a:spcPts val="0"/>
+              </a:spcAft>
+              <a:buClr>
+                <a:schemeClr val="accent1"/>
+              </a:buClr>
+              <a:buSzPct val="80000"/>
+              <a:buFont typeface="Wingdings 3" charset="2"/>
+              <a:buChar char=""/>
+              <a:defRPr sz="1800" b="0" i="0" kern="1200">
+                <a:solidFill>
+                  <a:schemeClr val="tx1">
+                    <a:lumMod val="75000"/>
+                    <a:lumOff val="25000"/>
+                  </a:schemeClr>
+                </a:solidFill>
+                <a:latin typeface="+mn-lt"/>
+                <a:ea typeface="+mn-ea"/>
+                <a:cs typeface="+mn-cs"/>
+              </a:defRPr>
+            </a:lvl1pPr>
+            <a:lvl2pPr marL="742950" indent="-285750" algn="l" defTabSz="457200" rtl="0" eaLnBrk="1" latinLnBrk="0" hangingPunct="1">
+              <a:spcBef>
+                <a:spcPts val="1000"/>
+              </a:spcBef>
+              <a:spcAft>
+                <a:spcPts val="0"/>
+              </a:spcAft>
+              <a:buClr>
+                <a:schemeClr val="accent1"/>
+              </a:buClr>
+              <a:buSzPct val="80000"/>
+              <a:buFont typeface="Wingdings 3" charset="2"/>
+              <a:buChar char=""/>
+              <a:defRPr sz="1600" b="0" i="0" kern="1200">
+                <a:solidFill>
+                  <a:schemeClr val="tx1">
+                    <a:lumMod val="75000"/>
+                    <a:lumOff val="25000"/>
+                  </a:schemeClr>
+                </a:solidFill>
+                <a:latin typeface="+mn-lt"/>
+                <a:ea typeface="+mn-ea"/>
+                <a:cs typeface="+mn-cs"/>
+              </a:defRPr>
+            </a:lvl2pPr>
+            <a:lvl3pPr marL="1143000" indent="-228600" algn="l" defTabSz="457200" rtl="0" eaLnBrk="1" latinLnBrk="0" hangingPunct="1">
+              <a:spcBef>
+                <a:spcPts val="1000"/>
+              </a:spcBef>
+              <a:spcAft>
+                <a:spcPts val="0"/>
+              </a:spcAft>
+              <a:buClr>
+                <a:schemeClr val="accent1"/>
+              </a:buClr>
+              <a:buSzPct val="80000"/>
+              <a:buFont typeface="Wingdings 3" charset="2"/>
+              <a:buChar char=""/>
+              <a:defRPr sz="1400" b="0" i="0" kern="1200">
+                <a:solidFill>
+                  <a:schemeClr val="tx1">
+                    <a:lumMod val="75000"/>
+                    <a:lumOff val="25000"/>
+                  </a:schemeClr>
+                </a:solidFill>
+                <a:latin typeface="+mn-lt"/>
+                <a:ea typeface="+mn-ea"/>
+                <a:cs typeface="+mn-cs"/>
+              </a:defRPr>
+            </a:lvl3pPr>
+            <a:lvl4pPr marL="1600200" indent="-228600" algn="l" defTabSz="457200" rtl="0" eaLnBrk="1" latinLnBrk="0" hangingPunct="1">
+              <a:spcBef>
+                <a:spcPts val="1000"/>
+              </a:spcBef>
+              <a:spcAft>
+                <a:spcPts val="0"/>
+              </a:spcAft>
+              <a:buClr>
+                <a:schemeClr val="accent1"/>
+              </a:buClr>
+              <a:buSzPct val="80000"/>
+              <a:buFont typeface="Wingdings 3" charset="2"/>
+              <a:buChar char=""/>
+              <a:defRPr sz="1200" b="0" i="0" kern="1200">
+                <a:solidFill>
+                  <a:schemeClr val="tx1">
+                    <a:lumMod val="75000"/>
+                    <a:lumOff val="25000"/>
+                  </a:schemeClr>
+                </a:solidFill>
+                <a:latin typeface="+mn-lt"/>
+                <a:ea typeface="+mn-ea"/>
+                <a:cs typeface="+mn-cs"/>
+              </a:defRPr>
+            </a:lvl4pPr>
+            <a:lvl5pPr marL="2057400" indent="-228600" algn="l" defTabSz="457200" rtl="0" eaLnBrk="1" latinLnBrk="0" hangingPunct="1">
+              <a:spcBef>
+                <a:spcPts val="1000"/>
+              </a:spcBef>
+              <a:spcAft>
+                <a:spcPts val="0"/>
+              </a:spcAft>
+              <a:buClr>
+                <a:schemeClr val="accent1"/>
+              </a:buClr>
+              <a:buSzPct val="80000"/>
+              <a:buFont typeface="Wingdings 3" charset="2"/>
+              <a:buChar char=""/>
+              <a:defRPr sz="1200" b="0" i="0" kern="1200">
+                <a:solidFill>
+                  <a:schemeClr val="tx1">
+                    <a:lumMod val="75000"/>
+                    <a:lumOff val="25000"/>
+                  </a:schemeClr>
+                </a:solidFill>
+                <a:latin typeface="+mn-lt"/>
+                <a:ea typeface="+mn-ea"/>
+                <a:cs typeface="+mn-cs"/>
+              </a:defRPr>
+            </a:lvl5pPr>
+            <a:lvl6pPr marL="2514600" indent="-228600" algn="l" defTabSz="457200" rtl="0" eaLnBrk="1" latinLnBrk="0" hangingPunct="1">
+              <a:spcBef>
+                <a:spcPts val="1000"/>
+              </a:spcBef>
+              <a:spcAft>
+                <a:spcPts val="0"/>
+              </a:spcAft>
+              <a:buClr>
+                <a:schemeClr val="accent1"/>
+              </a:buClr>
+              <a:buSzPct val="80000"/>
+              <a:buFont typeface="Wingdings 3" charset="2"/>
+              <a:buChar char=""/>
+              <a:defRPr sz="1200" b="0" i="0" kern="1200">
+                <a:solidFill>
+                  <a:schemeClr val="tx1">
+                    <a:lumMod val="75000"/>
+                    <a:lumOff val="25000"/>
+                  </a:schemeClr>
+                </a:solidFill>
+                <a:latin typeface="+mn-lt"/>
+                <a:ea typeface="+mn-ea"/>
+                <a:cs typeface="+mn-cs"/>
+              </a:defRPr>
+            </a:lvl6pPr>
+            <a:lvl7pPr marL="2971800" indent="-228600" algn="l" defTabSz="457200" rtl="0" eaLnBrk="1" latinLnBrk="0" hangingPunct="1">
+              <a:spcBef>
+                <a:spcPts val="1000"/>
+              </a:spcBef>
+              <a:spcAft>
+                <a:spcPts val="0"/>
+              </a:spcAft>
+              <a:buClr>
+                <a:schemeClr val="accent1"/>
+              </a:buClr>
+              <a:buSzPct val="80000"/>
+              <a:buFont typeface="Wingdings 3" charset="2"/>
+              <a:buChar char=""/>
+              <a:defRPr sz="1200" b="0" i="0" kern="1200">
+                <a:solidFill>
+                  <a:schemeClr val="tx1">
+                    <a:lumMod val="75000"/>
+                    <a:lumOff val="25000"/>
+                  </a:schemeClr>
+                </a:solidFill>
+                <a:latin typeface="+mn-lt"/>
+                <a:ea typeface="+mn-ea"/>
+                <a:cs typeface="+mn-cs"/>
+              </a:defRPr>
+            </a:lvl7pPr>
+            <a:lvl8pPr marL="3429000" indent="-228600" algn="l" defTabSz="457200" rtl="0" eaLnBrk="1" latinLnBrk="0" hangingPunct="1">
+              <a:spcBef>
+                <a:spcPts val="1000"/>
+              </a:spcBef>
+              <a:spcAft>
+                <a:spcPts val="0"/>
+              </a:spcAft>
+              <a:buClr>
+                <a:schemeClr val="accent1"/>
+              </a:buClr>
+              <a:buSzPct val="80000"/>
+              <a:buFont typeface="Wingdings 3" charset="2"/>
+              <a:buChar char=""/>
+              <a:defRPr sz="1200" b="0" i="0" kern="1200">
+                <a:solidFill>
+                  <a:schemeClr val="tx1">
+                    <a:lumMod val="75000"/>
+                    <a:lumOff val="25000"/>
+                  </a:schemeClr>
+                </a:solidFill>
+                <a:latin typeface="+mn-lt"/>
+                <a:ea typeface="+mn-ea"/>
+                <a:cs typeface="+mn-cs"/>
+              </a:defRPr>
+            </a:lvl8pPr>
+            <a:lvl9pPr marL="3886200" indent="-228600" algn="l" defTabSz="457200" rtl="0" eaLnBrk="1" latinLnBrk="0" hangingPunct="1">
+              <a:spcBef>
+                <a:spcPts val="1000"/>
+              </a:spcBef>
+              <a:spcAft>
+                <a:spcPts val="0"/>
+              </a:spcAft>
+              <a:buClr>
+                <a:schemeClr val="accent1"/>
+              </a:buClr>
+              <a:buSzPct val="80000"/>
+              <a:buFont typeface="Wingdings 3" charset="2"/>
+              <a:buChar char=""/>
+              <a:defRPr sz="1200" b="0" i="0" kern="1200">
+                <a:solidFill>
+                  <a:schemeClr val="tx1">
+                    <a:lumMod val="75000"/>
+                    <a:lumOff val="25000"/>
+                  </a:schemeClr>
+                </a:solidFill>
+                <a:latin typeface="+mn-lt"/>
+                <a:ea typeface="+mn-ea"/>
+                <a:cs typeface="+mn-cs"/>
+              </a:defRPr>
+            </a:lvl9pPr>
+          </a:lstStyle>
+          <a:p>
+            <a:r>
+              <a:rPr lang="en-US" dirty="0"/>
+              <a:t>Horizontal vs vertical Autoscaling</a:t>
+            </a:r>
+          </a:p>
+          <a:p>
+            <a:r>
+              <a:rPr lang="en-US" dirty="0"/>
+              <a:t>HPA understanding from K8S documentation</a:t>
+            </a:r>
+          </a:p>
+          <a:p>
+            <a:pPr lvl="1"/>
+            <a:r>
+              <a:rPr lang="en-US" dirty="0"/>
+              <a:t>Operational model</a:t>
+            </a:r>
+          </a:p>
+          <a:p>
+            <a:pPr lvl="1"/>
+            <a:r>
+              <a:rPr lang="en-US" dirty="0"/>
+              <a:t>Scope of implementation</a:t>
+            </a:r>
+          </a:p>
+          <a:p>
+            <a:pPr lvl="1"/>
+            <a:r>
+              <a:rPr lang="en-US" dirty="0"/>
+              <a:t>API Object</a:t>
+            </a:r>
+          </a:p>
+          <a:p>
+            <a:pPr lvl="1"/>
+            <a:r>
+              <a:rPr lang="en-US" dirty="0"/>
+              <a:t>Autoscaling during rolling update</a:t>
+            </a:r>
+          </a:p>
+          <a:p>
+            <a:pPr lvl="1"/>
+            <a:r>
+              <a:rPr lang="en-US" dirty="0"/>
+              <a:t>Support for resource metrics – CPU, Memory and customized</a:t>
+            </a:r>
+          </a:p>
+          <a:p>
+            <a:pPr lvl="1"/>
+            <a:r>
+              <a:rPr lang="en-US" dirty="0"/>
+              <a:t>Scaling behavior</a:t>
+            </a:r>
+          </a:p>
+          <a:p>
+            <a:pPr lvl="1"/>
+            <a:r>
+              <a:rPr lang="en-US" dirty="0"/>
+              <a:t>Example review – Metrics server</a:t>
+            </a:r>
+          </a:p>
+          <a:p>
+            <a:pPr lvl="1"/>
+            <a:endParaRPr lang="en-IN" dirty="0"/>
+          </a:p>
+        </p:txBody>
+      </p:sp>
+    </p:spTree>
+    <p:extLst>
+      <p:ext uri="{BB962C8B-B14F-4D97-AF65-F5344CB8AC3E}">
+        <p14:creationId xmlns:p14="http://schemas.microsoft.com/office/powerpoint/2010/main" val="4073770844"/>
+      </p:ext>
+    </p:extLst>
+  </p:cSld>
+  <p:clrMapOvr>
+    <a:masterClrMapping/>
+  </p:clrMapOvr>
+</p:sld>
+</file>
+
+<file path=ppt/slides/slide4.xml><?xml version="1.0" encoding="utf-8"?>
+<p:sld xmlns:a="http://schemas.openxmlformats.org/drawingml/2006/main" xmlns:r="http://schemas.openxmlformats.org/officeDocument/2006/relationships" xmlns:p="http://schemas.openxmlformats.org/presentationml/2006/main">
+  <p:cSld>
+    <p:spTree>
+      <p:nvGrpSpPr>
+        <p:cNvPr id="1" name=""/>
+        <p:cNvGrpSpPr/>
+        <p:nvPr/>
+      </p:nvGrpSpPr>
+      <p:grpSpPr>
+        <a:xfrm>
+          <a:off x="0" y="0"/>
+          <a:ext cx="0" cy="0"/>
+          <a:chOff x="0" y="0"/>
+          <a:chExt cx="0" cy="0"/>
+        </a:xfrm>
+      </p:grpSpPr>
+      <p:sp>
+        <p:nvSpPr>
+          <p:cNvPr id="2" name="Title 1">
+            <a:extLst>
+              <a:ext uri="{FF2B5EF4-FFF2-40B4-BE49-F238E27FC236}">
+                <a16:creationId xmlns:a16="http://schemas.microsoft.com/office/drawing/2014/main" id="{E56F869C-A1E7-4989-E938-BA5DE46D1FD1}"/>
+              </a:ext>
+            </a:extLst>
+          </p:cNvPr>
+          <p:cNvSpPr>
+            <a:spLocks noGrp="1"/>
+          </p:cNvSpPr>
+          <p:nvPr>
+            <p:ph type="title"/>
+          </p:nvPr>
+        </p:nvSpPr>
+        <p:spPr>
+          <a:xfrm>
+            <a:off x="717453" y="973668"/>
+            <a:ext cx="9198914" cy="706964"/>
+          </a:xfrm>
+        </p:spPr>
+        <p:txBody>
+          <a:bodyPr>
+            <a:normAutofit/>
+          </a:bodyPr>
+          <a:lstStyle/>
+          <a:p>
+            <a:r>
+              <a:rPr lang="en-US" dirty="0"/>
+              <a:t>Services</a:t>
+            </a:r>
+            <a:endParaRPr lang="en-IN" dirty="0"/>
+          </a:p>
+        </p:txBody>
+      </p:sp>
+      <p:sp>
+        <p:nvSpPr>
+          <p:cNvPr id="3" name="Content Placeholder 2">
+            <a:extLst>
+              <a:ext uri="{FF2B5EF4-FFF2-40B4-BE49-F238E27FC236}">
+                <a16:creationId xmlns:a16="http://schemas.microsoft.com/office/drawing/2014/main" id="{7B137940-CBB4-B117-F716-B9C1515405BD}"/>
+              </a:ext>
+            </a:extLst>
+          </p:cNvPr>
+          <p:cNvSpPr txBox="1">
+            <a:spLocks/>
+          </p:cNvSpPr>
+          <p:nvPr/>
+        </p:nvSpPr>
+        <p:spPr>
+          <a:xfrm>
+            <a:off x="717453" y="2431866"/>
+            <a:ext cx="9411285" cy="3727937"/>
+          </a:xfrm>
+          <a:prstGeom prst="rect">
+            <a:avLst/>
+          </a:prstGeom>
+        </p:spPr>
+        <p:txBody>
+          <a:bodyPr vert="horz" lIns="91440" tIns="45720" rIns="91440" bIns="45720" rtlCol="0">
+            <a:normAutofit/>
+          </a:bodyPr>
+          <a:lstStyle>
+            <a:lvl1pPr marL="342900" indent="-342900" algn="l" defTabSz="457200" rtl="0" eaLnBrk="1" latinLnBrk="0" hangingPunct="1">
+              <a:spcBef>
+                <a:spcPts val="1000"/>
+              </a:spcBef>
+              <a:spcAft>
+                <a:spcPts val="0"/>
+              </a:spcAft>
+              <a:buClr>
+                <a:schemeClr val="accent1"/>
+              </a:buClr>
+              <a:buSzPct val="80000"/>
+              <a:buFont typeface="Wingdings 3" charset="2"/>
+              <a:buChar char=""/>
+              <a:defRPr sz="1800" b="0" i="0" kern="1200">
+                <a:solidFill>
+                  <a:schemeClr val="tx1">
+                    <a:lumMod val="75000"/>
+                    <a:lumOff val="25000"/>
+                  </a:schemeClr>
+                </a:solidFill>
+                <a:latin typeface="+mn-lt"/>
+                <a:ea typeface="+mn-ea"/>
+                <a:cs typeface="+mn-cs"/>
+              </a:defRPr>
+            </a:lvl1pPr>
+            <a:lvl2pPr marL="742950" indent="-285750" algn="l" defTabSz="457200" rtl="0" eaLnBrk="1" latinLnBrk="0" hangingPunct="1">
+              <a:spcBef>
+                <a:spcPts val="1000"/>
+              </a:spcBef>
+              <a:spcAft>
+                <a:spcPts val="0"/>
+              </a:spcAft>
+              <a:buClr>
+                <a:schemeClr val="accent1"/>
+              </a:buClr>
+              <a:buSzPct val="80000"/>
+              <a:buFont typeface="Wingdings 3" charset="2"/>
+              <a:buChar char=""/>
+              <a:defRPr sz="1600" b="0" i="0" kern="1200">
+                <a:solidFill>
+                  <a:schemeClr val="tx1">
+                    <a:lumMod val="75000"/>
+                    <a:lumOff val="25000"/>
+                  </a:schemeClr>
+                </a:solidFill>
+                <a:latin typeface="+mn-lt"/>
+                <a:ea typeface="+mn-ea"/>
+                <a:cs typeface="+mn-cs"/>
+              </a:defRPr>
+            </a:lvl2pPr>
+            <a:lvl3pPr marL="1143000" indent="-228600" algn="l" defTabSz="457200" rtl="0" eaLnBrk="1" latinLnBrk="0" hangingPunct="1">
+              <a:spcBef>
+                <a:spcPts val="1000"/>
+              </a:spcBef>
+              <a:spcAft>
+                <a:spcPts val="0"/>
+              </a:spcAft>
+              <a:buClr>
+                <a:schemeClr val="accent1"/>
+              </a:buClr>
+              <a:buSzPct val="80000"/>
+              <a:buFont typeface="Wingdings 3" charset="2"/>
+              <a:buChar char=""/>
+              <a:defRPr sz="1400" b="0" i="0" kern="1200">
+                <a:solidFill>
+                  <a:schemeClr val="tx1">
+                    <a:lumMod val="75000"/>
+                    <a:lumOff val="25000"/>
+                  </a:schemeClr>
+                </a:solidFill>
+                <a:latin typeface="+mn-lt"/>
+                <a:ea typeface="+mn-ea"/>
+                <a:cs typeface="+mn-cs"/>
+              </a:defRPr>
+            </a:lvl3pPr>
+            <a:lvl4pPr marL="1600200" indent="-228600" algn="l" defTabSz="457200" rtl="0" eaLnBrk="1" latinLnBrk="0" hangingPunct="1">
+              <a:spcBef>
+                <a:spcPts val="1000"/>
+              </a:spcBef>
+              <a:spcAft>
+                <a:spcPts val="0"/>
+              </a:spcAft>
+              <a:buClr>
+                <a:schemeClr val="accent1"/>
+              </a:buClr>
+              <a:buSzPct val="80000"/>
+              <a:buFont typeface="Wingdings 3" charset="2"/>
+              <a:buChar char=""/>
+              <a:defRPr sz="1200" b="0" i="0" kern="1200">
+                <a:solidFill>
+                  <a:schemeClr val="tx1">
+                    <a:lumMod val="75000"/>
+                    <a:lumOff val="25000"/>
+                  </a:schemeClr>
+                </a:solidFill>
+                <a:latin typeface="+mn-lt"/>
+                <a:ea typeface="+mn-ea"/>
+                <a:cs typeface="+mn-cs"/>
+              </a:defRPr>
+            </a:lvl4pPr>
+            <a:lvl5pPr marL="2057400" indent="-228600" algn="l" defTabSz="457200" rtl="0" eaLnBrk="1" latinLnBrk="0" hangingPunct="1">
+              <a:spcBef>
+                <a:spcPts val="1000"/>
+              </a:spcBef>
+              <a:spcAft>
+                <a:spcPts val="0"/>
+              </a:spcAft>
+              <a:buClr>
+                <a:schemeClr val="accent1"/>
+              </a:buClr>
+              <a:buSzPct val="80000"/>
+              <a:buFont typeface="Wingdings 3" charset="2"/>
+              <a:buChar char=""/>
+              <a:defRPr sz="1200" b="0" i="0" kern="1200">
+                <a:solidFill>
+                  <a:schemeClr val="tx1">
+                    <a:lumMod val="75000"/>
+                    <a:lumOff val="25000"/>
+                  </a:schemeClr>
+                </a:solidFill>
+                <a:latin typeface="+mn-lt"/>
+                <a:ea typeface="+mn-ea"/>
+                <a:cs typeface="+mn-cs"/>
+              </a:defRPr>
+            </a:lvl5pPr>
+            <a:lvl6pPr marL="2514600" indent="-228600" algn="l" defTabSz="457200" rtl="0" eaLnBrk="1" latinLnBrk="0" hangingPunct="1">
+              <a:spcBef>
+                <a:spcPts val="1000"/>
+              </a:spcBef>
+              <a:spcAft>
+                <a:spcPts val="0"/>
+              </a:spcAft>
+              <a:buClr>
+                <a:schemeClr val="accent1"/>
+              </a:buClr>
+              <a:buSzPct val="80000"/>
+              <a:buFont typeface="Wingdings 3" charset="2"/>
+              <a:buChar char=""/>
+              <a:defRPr sz="1200" b="0" i="0" kern="1200">
+                <a:solidFill>
+                  <a:schemeClr val="tx1">
+                    <a:lumMod val="75000"/>
+                    <a:lumOff val="25000"/>
+                  </a:schemeClr>
+                </a:solidFill>
+                <a:latin typeface="+mn-lt"/>
+                <a:ea typeface="+mn-ea"/>
+                <a:cs typeface="+mn-cs"/>
+              </a:defRPr>
+            </a:lvl6pPr>
+            <a:lvl7pPr marL="2971800" indent="-228600" algn="l" defTabSz="457200" rtl="0" eaLnBrk="1" latinLnBrk="0" hangingPunct="1">
+              <a:spcBef>
+                <a:spcPts val="1000"/>
+              </a:spcBef>
+              <a:spcAft>
+                <a:spcPts val="0"/>
+              </a:spcAft>
+              <a:buClr>
+                <a:schemeClr val="accent1"/>
+              </a:buClr>
+              <a:buSzPct val="80000"/>
+              <a:buFont typeface="Wingdings 3" charset="2"/>
+              <a:buChar char=""/>
+              <a:defRPr sz="1200" b="0" i="0" kern="1200">
+                <a:solidFill>
+                  <a:schemeClr val="tx1">
+                    <a:lumMod val="75000"/>
+                    <a:lumOff val="25000"/>
+                  </a:schemeClr>
+                </a:solidFill>
+                <a:latin typeface="+mn-lt"/>
+                <a:ea typeface="+mn-ea"/>
+                <a:cs typeface="+mn-cs"/>
+              </a:defRPr>
+            </a:lvl7pPr>
+            <a:lvl8pPr marL="3429000" indent="-228600" algn="l" defTabSz="457200" rtl="0" eaLnBrk="1" latinLnBrk="0" hangingPunct="1">
+              <a:spcBef>
+                <a:spcPts val="1000"/>
+              </a:spcBef>
+              <a:spcAft>
+                <a:spcPts val="0"/>
+              </a:spcAft>
+              <a:buClr>
+                <a:schemeClr val="accent1"/>
+              </a:buClr>
+              <a:buSzPct val="80000"/>
+              <a:buFont typeface="Wingdings 3" charset="2"/>
+              <a:buChar char=""/>
+              <a:defRPr sz="1200" b="0" i="0" kern="1200">
+                <a:solidFill>
+                  <a:schemeClr val="tx1">
+                    <a:lumMod val="75000"/>
+                    <a:lumOff val="25000"/>
+                  </a:schemeClr>
+                </a:solidFill>
+                <a:latin typeface="+mn-lt"/>
+                <a:ea typeface="+mn-ea"/>
+                <a:cs typeface="+mn-cs"/>
+              </a:defRPr>
+            </a:lvl8pPr>
+            <a:lvl9pPr marL="3886200" indent="-228600" algn="l" defTabSz="457200" rtl="0" eaLnBrk="1" latinLnBrk="0" hangingPunct="1">
+              <a:spcBef>
+                <a:spcPts val="1000"/>
+              </a:spcBef>
+              <a:spcAft>
+                <a:spcPts val="0"/>
+              </a:spcAft>
+              <a:buClr>
+                <a:schemeClr val="accent1"/>
+              </a:buClr>
+              <a:buSzPct val="80000"/>
+              <a:buFont typeface="Wingdings 3" charset="2"/>
+              <a:buChar char=""/>
+              <a:defRPr sz="1200" b="0" i="0" kern="1200">
+                <a:solidFill>
+                  <a:schemeClr val="tx1">
+                    <a:lumMod val="75000"/>
+                    <a:lumOff val="25000"/>
+                  </a:schemeClr>
+                </a:solidFill>
+                <a:latin typeface="+mn-lt"/>
+                <a:ea typeface="+mn-ea"/>
+                <a:cs typeface="+mn-cs"/>
+              </a:defRPr>
+            </a:lvl9pPr>
+          </a:lstStyle>
+          <a:p>
+            <a:endParaRPr lang="en-US" dirty="0"/>
+          </a:p>
+          <a:p>
+            <a:pPr lvl="1"/>
+            <a:endParaRPr lang="en-IN" dirty="0"/>
+          </a:p>
+        </p:txBody>
+      </p:sp>
+    </p:spTree>
+    <p:extLst>
+      <p:ext uri="{BB962C8B-B14F-4D97-AF65-F5344CB8AC3E}">
+        <p14:creationId xmlns:p14="http://schemas.microsoft.com/office/powerpoint/2010/main" val="3923762247"/>
+      </p:ext>
+    </p:extLst>
+  </p:cSld>
+  <p:clrMapOvr>
+    <a:masterClrMapping/>
+  </p:clrMapOvr>
+</p:sld>
+</file>
+
+<file path=ppt/slides/slide5.xml><?xml version="1.0" encoding="utf-8"?>
+<p:sld xmlns:a="http://schemas.openxmlformats.org/drawingml/2006/main" xmlns:r="http://schemas.openxmlformats.org/officeDocument/2006/relationships" xmlns:p="http://schemas.openxmlformats.org/presentationml/2006/main">
+  <p:cSld>
+    <p:spTree>
+      <p:nvGrpSpPr>
+        <p:cNvPr id="1" name=""/>
+        <p:cNvGrpSpPr/>
+        <p:nvPr/>
+      </p:nvGrpSpPr>
+      <p:grpSpPr>
+        <a:xfrm>
+          <a:off x="0" y="0"/>
+          <a:ext cx="0" cy="0"/>
+          <a:chOff x="0" y="0"/>
+          <a:chExt cx="0" cy="0"/>
+        </a:xfrm>
+      </p:grpSpPr>
+      <p:sp>
+        <p:nvSpPr>
+          <p:cNvPr id="2" name="Title 1">
+            <a:extLst>
+              <a:ext uri="{FF2B5EF4-FFF2-40B4-BE49-F238E27FC236}">
+                <a16:creationId xmlns:a16="http://schemas.microsoft.com/office/drawing/2014/main" id="{E56F869C-A1E7-4989-E938-BA5DE46D1FD1}"/>
+              </a:ext>
+            </a:extLst>
+          </p:cNvPr>
+          <p:cNvSpPr>
+            <a:spLocks noGrp="1"/>
+          </p:cNvSpPr>
+          <p:nvPr>
+            <p:ph type="title"/>
+          </p:nvPr>
+        </p:nvSpPr>
+        <p:spPr>
+          <a:xfrm>
+            <a:off x="717453" y="973668"/>
+            <a:ext cx="9198914" cy="706964"/>
+          </a:xfrm>
+        </p:spPr>
+        <p:txBody>
+          <a:bodyPr>
+            <a:normAutofit/>
+          </a:bodyPr>
+          <a:lstStyle/>
+          <a:p>
+            <a:r>
+              <a:rPr lang="en-US" dirty="0"/>
+              <a:t>Ingress</a:t>
+            </a:r>
+            <a:endParaRPr lang="en-IN" dirty="0"/>
+          </a:p>
+        </p:txBody>
+      </p:sp>
+      <p:sp>
+        <p:nvSpPr>
+          <p:cNvPr id="3" name="Content Placeholder 2">
+            <a:extLst>
+              <a:ext uri="{FF2B5EF4-FFF2-40B4-BE49-F238E27FC236}">
+                <a16:creationId xmlns:a16="http://schemas.microsoft.com/office/drawing/2014/main" id="{7B137940-CBB4-B117-F716-B9C1515405BD}"/>
+              </a:ext>
+            </a:extLst>
+          </p:cNvPr>
+          <p:cNvSpPr txBox="1">
+            <a:spLocks/>
+          </p:cNvSpPr>
+          <p:nvPr/>
+        </p:nvSpPr>
+        <p:spPr>
+          <a:xfrm>
+            <a:off x="717453" y="2431866"/>
+            <a:ext cx="9411285" cy="3727937"/>
+          </a:xfrm>
+          <a:prstGeom prst="rect">
+            <a:avLst/>
+          </a:prstGeom>
+        </p:spPr>
+        <p:txBody>
+          <a:bodyPr vert="horz" lIns="91440" tIns="45720" rIns="91440" bIns="45720" rtlCol="0">
+            <a:normAutofit/>
+          </a:bodyPr>
+          <a:lstStyle>
+            <a:lvl1pPr marL="342900" indent="-342900" algn="l" defTabSz="457200" rtl="0" eaLnBrk="1" latinLnBrk="0" hangingPunct="1">
+              <a:spcBef>
+                <a:spcPts val="1000"/>
+              </a:spcBef>
+              <a:spcAft>
+                <a:spcPts val="0"/>
+              </a:spcAft>
+              <a:buClr>
+                <a:schemeClr val="accent1"/>
+              </a:buClr>
+              <a:buSzPct val="80000"/>
+              <a:buFont typeface="Wingdings 3" charset="2"/>
+              <a:buChar char=""/>
+              <a:defRPr sz="1800" b="0" i="0" kern="1200">
+                <a:solidFill>
+                  <a:schemeClr val="tx1">
+                    <a:lumMod val="75000"/>
+                    <a:lumOff val="25000"/>
+                  </a:schemeClr>
+                </a:solidFill>
+                <a:latin typeface="+mn-lt"/>
+                <a:ea typeface="+mn-ea"/>
+                <a:cs typeface="+mn-cs"/>
+              </a:defRPr>
+            </a:lvl1pPr>
+            <a:lvl2pPr marL="742950" indent="-285750" algn="l" defTabSz="457200" rtl="0" eaLnBrk="1" latinLnBrk="0" hangingPunct="1">
+              <a:spcBef>
+                <a:spcPts val="1000"/>
+              </a:spcBef>
+              <a:spcAft>
+                <a:spcPts val="0"/>
+              </a:spcAft>
+              <a:buClr>
+                <a:schemeClr val="accent1"/>
+              </a:buClr>
+              <a:buSzPct val="80000"/>
+              <a:buFont typeface="Wingdings 3" charset="2"/>
+              <a:buChar char=""/>
+              <a:defRPr sz="1600" b="0" i="0" kern="1200">
+                <a:solidFill>
+                  <a:schemeClr val="tx1">
+                    <a:lumMod val="75000"/>
+                    <a:lumOff val="25000"/>
+                  </a:schemeClr>
+                </a:solidFill>
+                <a:latin typeface="+mn-lt"/>
+                <a:ea typeface="+mn-ea"/>
+                <a:cs typeface="+mn-cs"/>
+              </a:defRPr>
+            </a:lvl2pPr>
+            <a:lvl3pPr marL="1143000" indent="-228600" algn="l" defTabSz="457200" rtl="0" eaLnBrk="1" latinLnBrk="0" hangingPunct="1">
+              <a:spcBef>
+                <a:spcPts val="1000"/>
+              </a:spcBef>
+              <a:spcAft>
+                <a:spcPts val="0"/>
+              </a:spcAft>
+              <a:buClr>
+                <a:schemeClr val="accent1"/>
+              </a:buClr>
+              <a:buSzPct val="80000"/>
+              <a:buFont typeface="Wingdings 3" charset="2"/>
+              <a:buChar char=""/>
+              <a:defRPr sz="1400" b="0" i="0" kern="1200">
+                <a:solidFill>
+                  <a:schemeClr val="tx1">
+                    <a:lumMod val="75000"/>
+                    <a:lumOff val="25000"/>
+                  </a:schemeClr>
+                </a:solidFill>
+                <a:latin typeface="+mn-lt"/>
+                <a:ea typeface="+mn-ea"/>
+                <a:cs typeface="+mn-cs"/>
+              </a:defRPr>
+            </a:lvl3pPr>
+            <a:lvl4pPr marL="1600200" indent="-228600" algn="l" defTabSz="457200" rtl="0" eaLnBrk="1" latinLnBrk="0" hangingPunct="1">
+              <a:spcBef>
+                <a:spcPts val="1000"/>
+              </a:spcBef>
+              <a:spcAft>
+                <a:spcPts val="0"/>
+              </a:spcAft>
+              <a:buClr>
+                <a:schemeClr val="accent1"/>
+              </a:buClr>
+              <a:buSzPct val="80000"/>
+              <a:buFont typeface="Wingdings 3" charset="2"/>
+              <a:buChar char=""/>
+              <a:defRPr sz="1200" b="0" i="0" kern="1200">
+                <a:solidFill>
+                  <a:schemeClr val="tx1">
+                    <a:lumMod val="75000"/>
+                    <a:lumOff val="25000"/>
+                  </a:schemeClr>
+                </a:solidFill>
+                <a:latin typeface="+mn-lt"/>
+                <a:ea typeface="+mn-ea"/>
+                <a:cs typeface="+mn-cs"/>
+              </a:defRPr>
+            </a:lvl4pPr>
+            <a:lvl5pPr marL="2057400" indent="-228600" algn="l" defTabSz="457200" rtl="0" eaLnBrk="1" latinLnBrk="0" hangingPunct="1">
+              <a:spcBef>
+                <a:spcPts val="1000"/>
+              </a:spcBef>
+              <a:spcAft>
+                <a:spcPts val="0"/>
+              </a:spcAft>
+              <a:buClr>
+                <a:schemeClr val="accent1"/>
+              </a:buClr>
+              <a:buSzPct val="80000"/>
+              <a:buFont typeface="Wingdings 3" charset="2"/>
+              <a:buChar char=""/>
+              <a:defRPr sz="1200" b="0" i="0" kern="1200">
+                <a:solidFill>
+                  <a:schemeClr val="tx1">
+                    <a:lumMod val="75000"/>
+                    <a:lumOff val="25000"/>
+                  </a:schemeClr>
+                </a:solidFill>
+                <a:latin typeface="+mn-lt"/>
+                <a:ea typeface="+mn-ea"/>
+                <a:cs typeface="+mn-cs"/>
+              </a:defRPr>
+            </a:lvl5pPr>
+            <a:lvl6pPr marL="2514600" indent="-228600" algn="l" defTabSz="457200" rtl="0" eaLnBrk="1" latinLnBrk="0" hangingPunct="1">
+              <a:spcBef>
+                <a:spcPts val="1000"/>
+              </a:spcBef>
+              <a:spcAft>
+                <a:spcPts val="0"/>
+              </a:spcAft>
+              <a:buClr>
+                <a:schemeClr val="accent1"/>
+              </a:buClr>
+              <a:buSzPct val="80000"/>
+              <a:buFont typeface="Wingdings 3" charset="2"/>
+              <a:buChar char=""/>
+              <a:defRPr sz="1200" b="0" i="0" kern="1200">
+                <a:solidFill>
+                  <a:schemeClr val="tx1">
+                    <a:lumMod val="75000"/>
+                    <a:lumOff val="25000"/>
+                  </a:schemeClr>
+                </a:solidFill>
+                <a:latin typeface="+mn-lt"/>
+                <a:ea typeface="+mn-ea"/>
+                <a:cs typeface="+mn-cs"/>
+              </a:defRPr>
+            </a:lvl6pPr>
+            <a:lvl7pPr marL="2971800" indent="-228600" algn="l" defTabSz="457200" rtl="0" eaLnBrk="1" latinLnBrk="0" hangingPunct="1">
+              <a:spcBef>
+                <a:spcPts val="1000"/>
+              </a:spcBef>
+              <a:spcAft>
+                <a:spcPts val="0"/>
+              </a:spcAft>
+              <a:buClr>
+                <a:schemeClr val="accent1"/>
+              </a:buClr>
+              <a:buSzPct val="80000"/>
+              <a:buFont typeface="Wingdings 3" charset="2"/>
+              <a:buChar char=""/>
+              <a:defRPr sz="1200" b="0" i="0" kern="1200">
+                <a:solidFill>
+                  <a:schemeClr val="tx1">
+                    <a:lumMod val="75000"/>
+                    <a:lumOff val="25000"/>
+                  </a:schemeClr>
+                </a:solidFill>
+                <a:latin typeface="+mn-lt"/>
+                <a:ea typeface="+mn-ea"/>
+                <a:cs typeface="+mn-cs"/>
+              </a:defRPr>
+            </a:lvl7pPr>
+            <a:lvl8pPr marL="3429000" indent="-228600" algn="l" defTabSz="457200" rtl="0" eaLnBrk="1" latinLnBrk="0" hangingPunct="1">
+              <a:spcBef>
+                <a:spcPts val="1000"/>
+              </a:spcBef>
+              <a:spcAft>
+                <a:spcPts val="0"/>
+              </a:spcAft>
+              <a:buClr>
+                <a:schemeClr val="accent1"/>
+              </a:buClr>
+              <a:buSzPct val="80000"/>
+              <a:buFont typeface="Wingdings 3" charset="2"/>
+              <a:buChar char=""/>
+              <a:defRPr sz="1200" b="0" i="0" kern="1200">
+                <a:solidFill>
+                  <a:schemeClr val="tx1">
+                    <a:lumMod val="75000"/>
+                    <a:lumOff val="25000"/>
+                  </a:schemeClr>
+                </a:solidFill>
+                <a:latin typeface="+mn-lt"/>
+                <a:ea typeface="+mn-ea"/>
+                <a:cs typeface="+mn-cs"/>
+              </a:defRPr>
+            </a:lvl8pPr>
+            <a:lvl9pPr marL="3886200" indent="-228600" algn="l" defTabSz="457200" rtl="0" eaLnBrk="1" latinLnBrk="0" hangingPunct="1">
+              <a:spcBef>
+                <a:spcPts val="1000"/>
+              </a:spcBef>
+              <a:spcAft>
+                <a:spcPts val="0"/>
+              </a:spcAft>
+              <a:buClr>
+                <a:schemeClr val="accent1"/>
+              </a:buClr>
+              <a:buSzPct val="80000"/>
+              <a:buFont typeface="Wingdings 3" charset="2"/>
+              <a:buChar char=""/>
+              <a:defRPr sz="1200" b="0" i="0" kern="1200">
+                <a:solidFill>
+                  <a:schemeClr val="tx1">
+                    <a:lumMod val="75000"/>
+                    <a:lumOff val="25000"/>
+                  </a:schemeClr>
+                </a:solidFill>
+                <a:latin typeface="+mn-lt"/>
+                <a:ea typeface="+mn-ea"/>
+                <a:cs typeface="+mn-cs"/>
+              </a:defRPr>
+            </a:lvl9pPr>
+          </a:lstStyle>
+          <a:p>
+            <a:endParaRPr lang="en-US" dirty="0"/>
+          </a:p>
+          <a:p>
+            <a:pPr lvl="1"/>
+            <a:endParaRPr lang="en-IN" dirty="0"/>
+          </a:p>
+        </p:txBody>
+      </p:sp>
+    </p:spTree>
+    <p:extLst>
+      <p:ext uri="{BB962C8B-B14F-4D97-AF65-F5344CB8AC3E}">
+        <p14:creationId xmlns:p14="http://schemas.microsoft.com/office/powerpoint/2010/main" val="3321783384"/>
+      </p:ext>
+    </p:extLst>
+  </p:cSld>
+  <p:clrMapOvr>
+    <a:masterClrMapping/>
+  </p:clrMapOvr>
+</p:sld>
+</file>
+
+<file path=ppt/slides/slide6.xml><?xml version="1.0" encoding="utf-8"?>
 <p:sld xmlns:a="http://schemas.openxmlformats.org/drawingml/2006/main" xmlns:r="http://schemas.openxmlformats.org/officeDocument/2006/relationships" xmlns:p="http://schemas.openxmlformats.org/presentationml/2006/main">
   <p:cSld>
     <p:spTree>

</xml_diff>

<commit_message>
Weekly plan updated for last week
</commit_message>
<xml_diff>
--- a/Day35/DockerAndKubernetes_Training-Day35.pptx
+++ b/Day35/DockerAndKubernetes_Training-Day35.pptx
@@ -5,15 +5,13 @@
     <p:sldMasterId id="2147483880" r:id="rId1"/>
   </p:sldMasterIdLst>
   <p:notesMasterIdLst>
-    <p:notesMasterId r:id="rId8"/>
+    <p:notesMasterId r:id="rId6"/>
   </p:notesMasterIdLst>
   <p:sldIdLst>
     <p:sldId id="439" r:id="rId2"/>
     <p:sldId id="449" r:id="rId3"/>
     <p:sldId id="452" r:id="rId4"/>
-    <p:sldId id="453" r:id="rId5"/>
-    <p:sldId id="454" r:id="rId6"/>
-    <p:sldId id="451" r:id="rId7"/>
+    <p:sldId id="451" r:id="rId5"/>
   </p:sldIdLst>
   <p:sldSz cx="12192000" cy="6858000"/>
   <p:notesSz cx="6858000" cy="9144000"/>
@@ -202,7 +200,7 @@
           <a:p>
             <a:fld id="{B09F413D-6E72-4B8A-80ED-A580F7C91B71}" type="datetimeFigureOut">
               <a:rPr lang="en-IN" smtClean="0"/>
-              <a:t>20-05-2023</a:t>
+              <a:t>21-05-2023</a:t>
             </a:fld>
             <a:endParaRPr lang="en-IN"/>
           </a:p>
@@ -805,7 +803,7 @@
           <a:p>
             <a:fld id="{12E8600E-B0EE-4521-BF40-4B72FBA06775}" type="datetimeFigureOut">
               <a:rPr lang="en-IN" smtClean="0"/>
-              <a:t>20-05-2023</a:t>
+              <a:t>21-05-2023</a:t>
             </a:fld>
             <a:endParaRPr lang="en-IN"/>
           </a:p>
@@ -1894,7 +1892,7 @@
             <a:fld id="{49F3E739-D457-46E5-B626-C9B182A007EE}" type="datetimeFigureOut">
               <a:rPr lang="en-US" smtClean="0"/>
               <a:pPr/>
-              <a:t>5/20/2023</a:t>
+              <a:t>5/21/2023</a:t>
             </a:fld>
             <a:endParaRPr lang="en-US"/>
           </a:p>
@@ -2876,7 +2874,7 @@
             <a:fld id="{49F3E739-D457-46E5-B626-C9B182A007EE}" type="datetimeFigureOut">
               <a:rPr lang="en-US" smtClean="0"/>
               <a:pPr/>
-              <a:t>5/20/2023</a:t>
+              <a:t>5/21/2023</a:t>
             </a:fld>
             <a:endParaRPr lang="en-US"/>
           </a:p>
@@ -4012,7 +4010,7 @@
             <a:fld id="{49F3E739-D457-46E5-B626-C9B182A007EE}" type="datetimeFigureOut">
               <a:rPr lang="en-US" smtClean="0"/>
               <a:pPr/>
-              <a:t>5/20/2023</a:t>
+              <a:t>5/21/2023</a:t>
             </a:fld>
             <a:endParaRPr lang="en-US"/>
           </a:p>
@@ -5047,7 +5045,7 @@
             <a:fld id="{49F3E739-D457-46E5-B626-C9B182A007EE}" type="datetimeFigureOut">
               <a:rPr lang="en-US" smtClean="0"/>
               <a:pPr/>
-              <a:t>5/20/2023</a:t>
+              <a:t>5/21/2023</a:t>
             </a:fld>
             <a:endParaRPr lang="en-US"/>
           </a:p>
@@ -5709,7 +5707,7 @@
             <a:fld id="{49F3E739-D457-46E5-B626-C9B182A007EE}" type="datetimeFigureOut">
               <a:rPr lang="en-US" smtClean="0"/>
               <a:pPr/>
-              <a:t>5/20/2023</a:t>
+              <a:t>5/21/2023</a:t>
             </a:fld>
             <a:endParaRPr lang="en-US"/>
           </a:p>
@@ -6572,7 +6570,7 @@
             <a:fld id="{49F3E739-D457-46E5-B626-C9B182A007EE}" type="datetimeFigureOut">
               <a:rPr lang="en-US" smtClean="0"/>
               <a:pPr/>
-              <a:t>5/20/2023</a:t>
+              <a:t>5/21/2023</a:t>
             </a:fld>
             <a:endParaRPr lang="en-US"/>
           </a:p>
@@ -6763,7 +6761,7 @@
           <a:p>
             <a:fld id="{12E8600E-B0EE-4521-BF40-4B72FBA06775}" type="datetimeFigureOut">
               <a:rPr lang="en-IN" smtClean="0"/>
-              <a:t>20-05-2023</a:t>
+              <a:t>21-05-2023</a:t>
             </a:fld>
             <a:endParaRPr lang="en-IN"/>
           </a:p>
@@ -7735,7 +7733,7 @@
           <a:p>
             <a:fld id="{12E8600E-B0EE-4521-BF40-4B72FBA06775}" type="datetimeFigureOut">
               <a:rPr lang="en-IN" smtClean="0"/>
-              <a:t>20-05-2023</a:t>
+              <a:t>21-05-2023</a:t>
             </a:fld>
             <a:endParaRPr lang="en-IN"/>
           </a:p>
@@ -7946,7 +7944,7 @@
           <a:p>
             <a:fld id="{12E8600E-B0EE-4521-BF40-4B72FBA06775}" type="datetimeFigureOut">
               <a:rPr lang="en-IN" smtClean="0"/>
-              <a:t>20-05-2023</a:t>
+              <a:t>21-05-2023</a:t>
             </a:fld>
             <a:endParaRPr lang="en-IN"/>
           </a:p>
@@ -8980,7 +8978,7 @@
           <a:p>
             <a:fld id="{12E8600E-B0EE-4521-BF40-4B72FBA06775}" type="datetimeFigureOut">
               <a:rPr lang="en-IN" smtClean="0"/>
-              <a:t>20-05-2023</a:t>
+              <a:t>21-05-2023</a:t>
             </a:fld>
             <a:endParaRPr lang="en-IN"/>
           </a:p>
@@ -9252,7 +9250,7 @@
           <a:p>
             <a:fld id="{12E8600E-B0EE-4521-BF40-4B72FBA06775}" type="datetimeFigureOut">
               <a:rPr lang="en-IN" smtClean="0"/>
-              <a:t>20-05-2023</a:t>
+              <a:t>21-05-2023</a:t>
             </a:fld>
             <a:endParaRPr lang="en-IN"/>
           </a:p>
@@ -9663,7 +9661,7 @@
             <a:fld id="{49F3E739-D457-46E5-B626-C9B182A007EE}" type="datetimeFigureOut">
               <a:rPr lang="en-US" smtClean="0"/>
               <a:pPr/>
-              <a:t>5/20/2023</a:t>
+              <a:t>5/21/2023</a:t>
             </a:fld>
             <a:endParaRPr lang="en-US"/>
           </a:p>
@@ -9791,7 +9789,7 @@
           <a:p>
             <a:fld id="{12E8600E-B0EE-4521-BF40-4B72FBA06775}" type="datetimeFigureOut">
               <a:rPr lang="en-IN" smtClean="0"/>
-              <a:t>20-05-2023</a:t>
+              <a:t>21-05-2023</a:t>
             </a:fld>
             <a:endParaRPr lang="en-IN"/>
           </a:p>
@@ -9886,7 +9884,7 @@
           <a:p>
             <a:fld id="{12E8600E-B0EE-4521-BF40-4B72FBA06775}" type="datetimeFigureOut">
               <a:rPr lang="en-IN" smtClean="0"/>
-              <a:t>20-05-2023</a:t>
+              <a:t>21-05-2023</a:t>
             </a:fld>
             <a:endParaRPr lang="en-IN"/>
           </a:p>
@@ -10967,7 +10965,7 @@
           <a:p>
             <a:fld id="{12E8600E-B0EE-4521-BF40-4B72FBA06775}" type="datetimeFigureOut">
               <a:rPr lang="en-IN" smtClean="0"/>
-              <a:t>20-05-2023</a:t>
+              <a:t>21-05-2023</a:t>
             </a:fld>
             <a:endParaRPr lang="en-IN"/>
           </a:p>
@@ -12076,7 +12074,7 @@
             <a:fld id="{49F3E739-D457-46E5-B626-C9B182A007EE}" type="datetimeFigureOut">
               <a:rPr lang="en-US" smtClean="0"/>
               <a:pPr/>
-              <a:t>5/20/2023</a:t>
+              <a:t>5/21/2023</a:t>
             </a:fld>
             <a:endParaRPr lang="en-US"/>
           </a:p>
@@ -13075,7 +13073,7 @@
             <a:fld id="{49F3E739-D457-46E5-B626-C9B182A007EE}" type="datetimeFigureOut">
               <a:rPr lang="en-US" smtClean="0"/>
               <a:pPr/>
-              <a:t>5/20/2023</a:t>
+              <a:t>5/21/2023</a:t>
             </a:fld>
             <a:endParaRPr lang="en-US"/>
           </a:p>
@@ -14050,11 +14048,7 @@
           <a:p>
             <a:r>
               <a:rPr lang="en-US" dirty="0"/>
-              <a:t>Secret – Volume </a:t>
-            </a:r>
-            <a:r>
-              <a:rPr lang="en-US"/>
-              <a:t>based example</a:t>
+              <a:t>Secret – Volume based example</a:t>
             </a:r>
           </a:p>
           <a:p>
@@ -14468,13 +14462,8 @@
             <a:pPr lvl="1"/>
             <a:r>
               <a:rPr lang="en-US" dirty="0"/>
-              <a:t>Metrics </a:t>
+              <a:t>Metrics server details</a:t>
             </a:r>
-            <a:r>
-              <a:rPr lang="en-US"/>
-              <a:t>server details</a:t>
-            </a:r>
-            <a:endParaRPr lang="en-US" dirty="0"/>
           </a:p>
           <a:p>
             <a:pPr lvl="1"/>
@@ -14496,664 +14485,6 @@
 </file>
 
 <file path=ppt/slides/slide4.xml><?xml version="1.0" encoding="utf-8"?>
-<p:sld xmlns:a="http://schemas.openxmlformats.org/drawingml/2006/main" xmlns:r="http://schemas.openxmlformats.org/officeDocument/2006/relationships" xmlns:p="http://schemas.openxmlformats.org/presentationml/2006/main">
-  <p:cSld>
-    <p:spTree>
-      <p:nvGrpSpPr>
-        <p:cNvPr id="1" name=""/>
-        <p:cNvGrpSpPr/>
-        <p:nvPr/>
-      </p:nvGrpSpPr>
-      <p:grpSpPr>
-        <a:xfrm>
-          <a:off x="0" y="0"/>
-          <a:ext cx="0" cy="0"/>
-          <a:chOff x="0" y="0"/>
-          <a:chExt cx="0" cy="0"/>
-        </a:xfrm>
-      </p:grpSpPr>
-      <p:sp>
-        <p:nvSpPr>
-          <p:cNvPr id="2" name="Title 1">
-            <a:extLst>
-              <a:ext uri="{FF2B5EF4-FFF2-40B4-BE49-F238E27FC236}">
-                <a16:creationId xmlns:a16="http://schemas.microsoft.com/office/drawing/2014/main" id="{E56F869C-A1E7-4989-E938-BA5DE46D1FD1}"/>
-              </a:ext>
-            </a:extLst>
-          </p:cNvPr>
-          <p:cNvSpPr>
-            <a:spLocks noGrp="1"/>
-          </p:cNvSpPr>
-          <p:nvPr>
-            <p:ph type="title"/>
-          </p:nvPr>
-        </p:nvSpPr>
-        <p:spPr>
-          <a:xfrm>
-            <a:off x="717453" y="973668"/>
-            <a:ext cx="9198914" cy="706964"/>
-          </a:xfrm>
-        </p:spPr>
-        <p:txBody>
-          <a:bodyPr>
-            <a:normAutofit/>
-          </a:bodyPr>
-          <a:lstStyle/>
-          <a:p>
-            <a:r>
-              <a:rPr lang="en-US" dirty="0"/>
-              <a:t>Services - Concepts</a:t>
-            </a:r>
-            <a:endParaRPr lang="en-IN" dirty="0"/>
-          </a:p>
-        </p:txBody>
-      </p:sp>
-      <p:sp>
-        <p:nvSpPr>
-          <p:cNvPr id="3" name="Content Placeholder 2">
-            <a:extLst>
-              <a:ext uri="{FF2B5EF4-FFF2-40B4-BE49-F238E27FC236}">
-                <a16:creationId xmlns:a16="http://schemas.microsoft.com/office/drawing/2014/main" id="{7B137940-CBB4-B117-F716-B9C1515405BD}"/>
-              </a:ext>
-            </a:extLst>
-          </p:cNvPr>
-          <p:cNvSpPr txBox="1">
-            <a:spLocks/>
-          </p:cNvSpPr>
-          <p:nvPr/>
-        </p:nvSpPr>
-        <p:spPr>
-          <a:xfrm>
-            <a:off x="717453" y="2431866"/>
-            <a:ext cx="9411285" cy="3727937"/>
-          </a:xfrm>
-          <a:prstGeom prst="rect">
-            <a:avLst/>
-          </a:prstGeom>
-        </p:spPr>
-        <p:txBody>
-          <a:bodyPr vert="horz" lIns="91440" tIns="45720" rIns="91440" bIns="45720" rtlCol="0">
-            <a:normAutofit/>
-          </a:bodyPr>
-          <a:lstStyle>
-            <a:lvl1pPr marL="342900" indent="-342900" algn="l" defTabSz="457200" rtl="0" eaLnBrk="1" latinLnBrk="0" hangingPunct="1">
-              <a:spcBef>
-                <a:spcPts val="1000"/>
-              </a:spcBef>
-              <a:spcAft>
-                <a:spcPts val="0"/>
-              </a:spcAft>
-              <a:buClr>
-                <a:schemeClr val="accent1"/>
-              </a:buClr>
-              <a:buSzPct val="80000"/>
-              <a:buFont typeface="Wingdings 3" charset="2"/>
-              <a:buChar char=""/>
-              <a:defRPr sz="1800" b="0" i="0" kern="1200">
-                <a:solidFill>
-                  <a:schemeClr val="tx1">
-                    <a:lumMod val="75000"/>
-                    <a:lumOff val="25000"/>
-                  </a:schemeClr>
-                </a:solidFill>
-                <a:latin typeface="+mn-lt"/>
-                <a:ea typeface="+mn-ea"/>
-                <a:cs typeface="+mn-cs"/>
-              </a:defRPr>
-            </a:lvl1pPr>
-            <a:lvl2pPr marL="742950" indent="-285750" algn="l" defTabSz="457200" rtl="0" eaLnBrk="1" latinLnBrk="0" hangingPunct="1">
-              <a:spcBef>
-                <a:spcPts val="1000"/>
-              </a:spcBef>
-              <a:spcAft>
-                <a:spcPts val="0"/>
-              </a:spcAft>
-              <a:buClr>
-                <a:schemeClr val="accent1"/>
-              </a:buClr>
-              <a:buSzPct val="80000"/>
-              <a:buFont typeface="Wingdings 3" charset="2"/>
-              <a:buChar char=""/>
-              <a:defRPr sz="1600" b="0" i="0" kern="1200">
-                <a:solidFill>
-                  <a:schemeClr val="tx1">
-                    <a:lumMod val="75000"/>
-                    <a:lumOff val="25000"/>
-                  </a:schemeClr>
-                </a:solidFill>
-                <a:latin typeface="+mn-lt"/>
-                <a:ea typeface="+mn-ea"/>
-                <a:cs typeface="+mn-cs"/>
-              </a:defRPr>
-            </a:lvl2pPr>
-            <a:lvl3pPr marL="1143000" indent="-228600" algn="l" defTabSz="457200" rtl="0" eaLnBrk="1" latinLnBrk="0" hangingPunct="1">
-              <a:spcBef>
-                <a:spcPts val="1000"/>
-              </a:spcBef>
-              <a:spcAft>
-                <a:spcPts val="0"/>
-              </a:spcAft>
-              <a:buClr>
-                <a:schemeClr val="accent1"/>
-              </a:buClr>
-              <a:buSzPct val="80000"/>
-              <a:buFont typeface="Wingdings 3" charset="2"/>
-              <a:buChar char=""/>
-              <a:defRPr sz="1400" b="0" i="0" kern="1200">
-                <a:solidFill>
-                  <a:schemeClr val="tx1">
-                    <a:lumMod val="75000"/>
-                    <a:lumOff val="25000"/>
-                  </a:schemeClr>
-                </a:solidFill>
-                <a:latin typeface="+mn-lt"/>
-                <a:ea typeface="+mn-ea"/>
-                <a:cs typeface="+mn-cs"/>
-              </a:defRPr>
-            </a:lvl3pPr>
-            <a:lvl4pPr marL="1600200" indent="-228600" algn="l" defTabSz="457200" rtl="0" eaLnBrk="1" latinLnBrk="0" hangingPunct="1">
-              <a:spcBef>
-                <a:spcPts val="1000"/>
-              </a:spcBef>
-              <a:spcAft>
-                <a:spcPts val="0"/>
-              </a:spcAft>
-              <a:buClr>
-                <a:schemeClr val="accent1"/>
-              </a:buClr>
-              <a:buSzPct val="80000"/>
-              <a:buFont typeface="Wingdings 3" charset="2"/>
-              <a:buChar char=""/>
-              <a:defRPr sz="1200" b="0" i="0" kern="1200">
-                <a:solidFill>
-                  <a:schemeClr val="tx1">
-                    <a:lumMod val="75000"/>
-                    <a:lumOff val="25000"/>
-                  </a:schemeClr>
-                </a:solidFill>
-                <a:latin typeface="+mn-lt"/>
-                <a:ea typeface="+mn-ea"/>
-                <a:cs typeface="+mn-cs"/>
-              </a:defRPr>
-            </a:lvl4pPr>
-            <a:lvl5pPr marL="2057400" indent="-228600" algn="l" defTabSz="457200" rtl="0" eaLnBrk="1" latinLnBrk="0" hangingPunct="1">
-              <a:spcBef>
-                <a:spcPts val="1000"/>
-              </a:spcBef>
-              <a:spcAft>
-                <a:spcPts val="0"/>
-              </a:spcAft>
-              <a:buClr>
-                <a:schemeClr val="accent1"/>
-              </a:buClr>
-              <a:buSzPct val="80000"/>
-              <a:buFont typeface="Wingdings 3" charset="2"/>
-              <a:buChar char=""/>
-              <a:defRPr sz="1200" b="0" i="0" kern="1200">
-                <a:solidFill>
-                  <a:schemeClr val="tx1">
-                    <a:lumMod val="75000"/>
-                    <a:lumOff val="25000"/>
-                  </a:schemeClr>
-                </a:solidFill>
-                <a:latin typeface="+mn-lt"/>
-                <a:ea typeface="+mn-ea"/>
-                <a:cs typeface="+mn-cs"/>
-              </a:defRPr>
-            </a:lvl5pPr>
-            <a:lvl6pPr marL="2514600" indent="-228600" algn="l" defTabSz="457200" rtl="0" eaLnBrk="1" latinLnBrk="0" hangingPunct="1">
-              <a:spcBef>
-                <a:spcPts val="1000"/>
-              </a:spcBef>
-              <a:spcAft>
-                <a:spcPts val="0"/>
-              </a:spcAft>
-              <a:buClr>
-                <a:schemeClr val="accent1"/>
-              </a:buClr>
-              <a:buSzPct val="80000"/>
-              <a:buFont typeface="Wingdings 3" charset="2"/>
-              <a:buChar char=""/>
-              <a:defRPr sz="1200" b="0" i="0" kern="1200">
-                <a:solidFill>
-                  <a:schemeClr val="tx1">
-                    <a:lumMod val="75000"/>
-                    <a:lumOff val="25000"/>
-                  </a:schemeClr>
-                </a:solidFill>
-                <a:latin typeface="+mn-lt"/>
-                <a:ea typeface="+mn-ea"/>
-                <a:cs typeface="+mn-cs"/>
-              </a:defRPr>
-            </a:lvl6pPr>
-            <a:lvl7pPr marL="2971800" indent="-228600" algn="l" defTabSz="457200" rtl="0" eaLnBrk="1" latinLnBrk="0" hangingPunct="1">
-              <a:spcBef>
-                <a:spcPts val="1000"/>
-              </a:spcBef>
-              <a:spcAft>
-                <a:spcPts val="0"/>
-              </a:spcAft>
-              <a:buClr>
-                <a:schemeClr val="accent1"/>
-              </a:buClr>
-              <a:buSzPct val="80000"/>
-              <a:buFont typeface="Wingdings 3" charset="2"/>
-              <a:buChar char=""/>
-              <a:defRPr sz="1200" b="0" i="0" kern="1200">
-                <a:solidFill>
-                  <a:schemeClr val="tx1">
-                    <a:lumMod val="75000"/>
-                    <a:lumOff val="25000"/>
-                  </a:schemeClr>
-                </a:solidFill>
-                <a:latin typeface="+mn-lt"/>
-                <a:ea typeface="+mn-ea"/>
-                <a:cs typeface="+mn-cs"/>
-              </a:defRPr>
-            </a:lvl7pPr>
-            <a:lvl8pPr marL="3429000" indent="-228600" algn="l" defTabSz="457200" rtl="0" eaLnBrk="1" latinLnBrk="0" hangingPunct="1">
-              <a:spcBef>
-                <a:spcPts val="1000"/>
-              </a:spcBef>
-              <a:spcAft>
-                <a:spcPts val="0"/>
-              </a:spcAft>
-              <a:buClr>
-                <a:schemeClr val="accent1"/>
-              </a:buClr>
-              <a:buSzPct val="80000"/>
-              <a:buFont typeface="Wingdings 3" charset="2"/>
-              <a:buChar char=""/>
-              <a:defRPr sz="1200" b="0" i="0" kern="1200">
-                <a:solidFill>
-                  <a:schemeClr val="tx1">
-                    <a:lumMod val="75000"/>
-                    <a:lumOff val="25000"/>
-                  </a:schemeClr>
-                </a:solidFill>
-                <a:latin typeface="+mn-lt"/>
-                <a:ea typeface="+mn-ea"/>
-                <a:cs typeface="+mn-cs"/>
-              </a:defRPr>
-            </a:lvl8pPr>
-            <a:lvl9pPr marL="3886200" indent="-228600" algn="l" defTabSz="457200" rtl="0" eaLnBrk="1" latinLnBrk="0" hangingPunct="1">
-              <a:spcBef>
-                <a:spcPts val="1000"/>
-              </a:spcBef>
-              <a:spcAft>
-                <a:spcPts val="0"/>
-              </a:spcAft>
-              <a:buClr>
-                <a:schemeClr val="accent1"/>
-              </a:buClr>
-              <a:buSzPct val="80000"/>
-              <a:buFont typeface="Wingdings 3" charset="2"/>
-              <a:buChar char=""/>
-              <a:defRPr sz="1200" b="0" i="0" kern="1200">
-                <a:solidFill>
-                  <a:schemeClr val="tx1">
-                    <a:lumMod val="75000"/>
-                    <a:lumOff val="25000"/>
-                  </a:schemeClr>
-                </a:solidFill>
-                <a:latin typeface="+mn-lt"/>
-                <a:ea typeface="+mn-ea"/>
-                <a:cs typeface="+mn-cs"/>
-              </a:defRPr>
-            </a:lvl9pPr>
-          </a:lstStyle>
-          <a:p>
-            <a:endParaRPr lang="en-US" dirty="0"/>
-          </a:p>
-          <a:p>
-            <a:pPr lvl="1"/>
-            <a:endParaRPr lang="en-IN" dirty="0"/>
-          </a:p>
-        </p:txBody>
-      </p:sp>
-    </p:spTree>
-    <p:extLst>
-      <p:ext uri="{BB962C8B-B14F-4D97-AF65-F5344CB8AC3E}">
-        <p14:creationId xmlns:p14="http://schemas.microsoft.com/office/powerpoint/2010/main" val="3923762247"/>
-      </p:ext>
-    </p:extLst>
-  </p:cSld>
-  <p:clrMapOvr>
-    <a:masterClrMapping/>
-  </p:clrMapOvr>
-</p:sld>
-</file>
-
-<file path=ppt/slides/slide5.xml><?xml version="1.0" encoding="utf-8"?>
-<p:sld xmlns:a="http://schemas.openxmlformats.org/drawingml/2006/main" xmlns:r="http://schemas.openxmlformats.org/officeDocument/2006/relationships" xmlns:p="http://schemas.openxmlformats.org/presentationml/2006/main">
-  <p:cSld>
-    <p:spTree>
-      <p:nvGrpSpPr>
-        <p:cNvPr id="1" name=""/>
-        <p:cNvGrpSpPr/>
-        <p:nvPr/>
-      </p:nvGrpSpPr>
-      <p:grpSpPr>
-        <a:xfrm>
-          <a:off x="0" y="0"/>
-          <a:ext cx="0" cy="0"/>
-          <a:chOff x="0" y="0"/>
-          <a:chExt cx="0" cy="0"/>
-        </a:xfrm>
-      </p:grpSpPr>
-      <p:sp>
-        <p:nvSpPr>
-          <p:cNvPr id="2" name="Title 1">
-            <a:extLst>
-              <a:ext uri="{FF2B5EF4-FFF2-40B4-BE49-F238E27FC236}">
-                <a16:creationId xmlns:a16="http://schemas.microsoft.com/office/drawing/2014/main" id="{E56F869C-A1E7-4989-E938-BA5DE46D1FD1}"/>
-              </a:ext>
-            </a:extLst>
-          </p:cNvPr>
-          <p:cNvSpPr>
-            <a:spLocks noGrp="1"/>
-          </p:cNvSpPr>
-          <p:nvPr>
-            <p:ph type="title"/>
-          </p:nvPr>
-        </p:nvSpPr>
-        <p:spPr>
-          <a:xfrm>
-            <a:off x="717453" y="973668"/>
-            <a:ext cx="9198914" cy="706964"/>
-          </a:xfrm>
-        </p:spPr>
-        <p:txBody>
-          <a:bodyPr>
-            <a:normAutofit/>
-          </a:bodyPr>
-          <a:lstStyle/>
-          <a:p>
-            <a:r>
-              <a:rPr lang="en-US" dirty="0"/>
-              <a:t>Ingress</a:t>
-            </a:r>
-            <a:endParaRPr lang="en-IN" dirty="0"/>
-          </a:p>
-        </p:txBody>
-      </p:sp>
-      <p:sp>
-        <p:nvSpPr>
-          <p:cNvPr id="3" name="Content Placeholder 2">
-            <a:extLst>
-              <a:ext uri="{FF2B5EF4-FFF2-40B4-BE49-F238E27FC236}">
-                <a16:creationId xmlns:a16="http://schemas.microsoft.com/office/drawing/2014/main" id="{7B137940-CBB4-B117-F716-B9C1515405BD}"/>
-              </a:ext>
-            </a:extLst>
-          </p:cNvPr>
-          <p:cNvSpPr txBox="1">
-            <a:spLocks/>
-          </p:cNvSpPr>
-          <p:nvPr/>
-        </p:nvSpPr>
-        <p:spPr>
-          <a:xfrm>
-            <a:off x="717453" y="2431866"/>
-            <a:ext cx="9411285" cy="3727937"/>
-          </a:xfrm>
-          <a:prstGeom prst="rect">
-            <a:avLst/>
-          </a:prstGeom>
-        </p:spPr>
-        <p:txBody>
-          <a:bodyPr vert="horz" lIns="91440" tIns="45720" rIns="91440" bIns="45720" rtlCol="0">
-            <a:normAutofit/>
-          </a:bodyPr>
-          <a:lstStyle>
-            <a:lvl1pPr marL="342900" indent="-342900" algn="l" defTabSz="457200" rtl="0" eaLnBrk="1" latinLnBrk="0" hangingPunct="1">
-              <a:spcBef>
-                <a:spcPts val="1000"/>
-              </a:spcBef>
-              <a:spcAft>
-                <a:spcPts val="0"/>
-              </a:spcAft>
-              <a:buClr>
-                <a:schemeClr val="accent1"/>
-              </a:buClr>
-              <a:buSzPct val="80000"/>
-              <a:buFont typeface="Wingdings 3" charset="2"/>
-              <a:buChar char=""/>
-              <a:defRPr sz="1800" b="0" i="0" kern="1200">
-                <a:solidFill>
-                  <a:schemeClr val="tx1">
-                    <a:lumMod val="75000"/>
-                    <a:lumOff val="25000"/>
-                  </a:schemeClr>
-                </a:solidFill>
-                <a:latin typeface="+mn-lt"/>
-                <a:ea typeface="+mn-ea"/>
-                <a:cs typeface="+mn-cs"/>
-              </a:defRPr>
-            </a:lvl1pPr>
-            <a:lvl2pPr marL="742950" indent="-285750" algn="l" defTabSz="457200" rtl="0" eaLnBrk="1" latinLnBrk="0" hangingPunct="1">
-              <a:spcBef>
-                <a:spcPts val="1000"/>
-              </a:spcBef>
-              <a:spcAft>
-                <a:spcPts val="0"/>
-              </a:spcAft>
-              <a:buClr>
-                <a:schemeClr val="accent1"/>
-              </a:buClr>
-              <a:buSzPct val="80000"/>
-              <a:buFont typeface="Wingdings 3" charset="2"/>
-              <a:buChar char=""/>
-              <a:defRPr sz="1600" b="0" i="0" kern="1200">
-                <a:solidFill>
-                  <a:schemeClr val="tx1">
-                    <a:lumMod val="75000"/>
-                    <a:lumOff val="25000"/>
-                  </a:schemeClr>
-                </a:solidFill>
-                <a:latin typeface="+mn-lt"/>
-                <a:ea typeface="+mn-ea"/>
-                <a:cs typeface="+mn-cs"/>
-              </a:defRPr>
-            </a:lvl2pPr>
-            <a:lvl3pPr marL="1143000" indent="-228600" algn="l" defTabSz="457200" rtl="0" eaLnBrk="1" latinLnBrk="0" hangingPunct="1">
-              <a:spcBef>
-                <a:spcPts val="1000"/>
-              </a:spcBef>
-              <a:spcAft>
-                <a:spcPts val="0"/>
-              </a:spcAft>
-              <a:buClr>
-                <a:schemeClr val="accent1"/>
-              </a:buClr>
-              <a:buSzPct val="80000"/>
-              <a:buFont typeface="Wingdings 3" charset="2"/>
-              <a:buChar char=""/>
-              <a:defRPr sz="1400" b="0" i="0" kern="1200">
-                <a:solidFill>
-                  <a:schemeClr val="tx1">
-                    <a:lumMod val="75000"/>
-                    <a:lumOff val="25000"/>
-                  </a:schemeClr>
-                </a:solidFill>
-                <a:latin typeface="+mn-lt"/>
-                <a:ea typeface="+mn-ea"/>
-                <a:cs typeface="+mn-cs"/>
-              </a:defRPr>
-            </a:lvl3pPr>
-            <a:lvl4pPr marL="1600200" indent="-228600" algn="l" defTabSz="457200" rtl="0" eaLnBrk="1" latinLnBrk="0" hangingPunct="1">
-              <a:spcBef>
-                <a:spcPts val="1000"/>
-              </a:spcBef>
-              <a:spcAft>
-                <a:spcPts val="0"/>
-              </a:spcAft>
-              <a:buClr>
-                <a:schemeClr val="accent1"/>
-              </a:buClr>
-              <a:buSzPct val="80000"/>
-              <a:buFont typeface="Wingdings 3" charset="2"/>
-              <a:buChar char=""/>
-              <a:defRPr sz="1200" b="0" i="0" kern="1200">
-                <a:solidFill>
-                  <a:schemeClr val="tx1">
-                    <a:lumMod val="75000"/>
-                    <a:lumOff val="25000"/>
-                  </a:schemeClr>
-                </a:solidFill>
-                <a:latin typeface="+mn-lt"/>
-                <a:ea typeface="+mn-ea"/>
-                <a:cs typeface="+mn-cs"/>
-              </a:defRPr>
-            </a:lvl4pPr>
-            <a:lvl5pPr marL="2057400" indent="-228600" algn="l" defTabSz="457200" rtl="0" eaLnBrk="1" latinLnBrk="0" hangingPunct="1">
-              <a:spcBef>
-                <a:spcPts val="1000"/>
-              </a:spcBef>
-              <a:spcAft>
-                <a:spcPts val="0"/>
-              </a:spcAft>
-              <a:buClr>
-                <a:schemeClr val="accent1"/>
-              </a:buClr>
-              <a:buSzPct val="80000"/>
-              <a:buFont typeface="Wingdings 3" charset="2"/>
-              <a:buChar char=""/>
-              <a:defRPr sz="1200" b="0" i="0" kern="1200">
-                <a:solidFill>
-                  <a:schemeClr val="tx1">
-                    <a:lumMod val="75000"/>
-                    <a:lumOff val="25000"/>
-                  </a:schemeClr>
-                </a:solidFill>
-                <a:latin typeface="+mn-lt"/>
-                <a:ea typeface="+mn-ea"/>
-                <a:cs typeface="+mn-cs"/>
-              </a:defRPr>
-            </a:lvl5pPr>
-            <a:lvl6pPr marL="2514600" indent="-228600" algn="l" defTabSz="457200" rtl="0" eaLnBrk="1" latinLnBrk="0" hangingPunct="1">
-              <a:spcBef>
-                <a:spcPts val="1000"/>
-              </a:spcBef>
-              <a:spcAft>
-                <a:spcPts val="0"/>
-              </a:spcAft>
-              <a:buClr>
-                <a:schemeClr val="accent1"/>
-              </a:buClr>
-              <a:buSzPct val="80000"/>
-              <a:buFont typeface="Wingdings 3" charset="2"/>
-              <a:buChar char=""/>
-              <a:defRPr sz="1200" b="0" i="0" kern="1200">
-                <a:solidFill>
-                  <a:schemeClr val="tx1">
-                    <a:lumMod val="75000"/>
-                    <a:lumOff val="25000"/>
-                  </a:schemeClr>
-                </a:solidFill>
-                <a:latin typeface="+mn-lt"/>
-                <a:ea typeface="+mn-ea"/>
-                <a:cs typeface="+mn-cs"/>
-              </a:defRPr>
-            </a:lvl6pPr>
-            <a:lvl7pPr marL="2971800" indent="-228600" algn="l" defTabSz="457200" rtl="0" eaLnBrk="1" latinLnBrk="0" hangingPunct="1">
-              <a:spcBef>
-                <a:spcPts val="1000"/>
-              </a:spcBef>
-              <a:spcAft>
-                <a:spcPts val="0"/>
-              </a:spcAft>
-              <a:buClr>
-                <a:schemeClr val="accent1"/>
-              </a:buClr>
-              <a:buSzPct val="80000"/>
-              <a:buFont typeface="Wingdings 3" charset="2"/>
-              <a:buChar char=""/>
-              <a:defRPr sz="1200" b="0" i="0" kern="1200">
-                <a:solidFill>
-                  <a:schemeClr val="tx1">
-                    <a:lumMod val="75000"/>
-                    <a:lumOff val="25000"/>
-                  </a:schemeClr>
-                </a:solidFill>
-                <a:latin typeface="+mn-lt"/>
-                <a:ea typeface="+mn-ea"/>
-                <a:cs typeface="+mn-cs"/>
-              </a:defRPr>
-            </a:lvl7pPr>
-            <a:lvl8pPr marL="3429000" indent="-228600" algn="l" defTabSz="457200" rtl="0" eaLnBrk="1" latinLnBrk="0" hangingPunct="1">
-              <a:spcBef>
-                <a:spcPts val="1000"/>
-              </a:spcBef>
-              <a:spcAft>
-                <a:spcPts val="0"/>
-              </a:spcAft>
-              <a:buClr>
-                <a:schemeClr val="accent1"/>
-              </a:buClr>
-              <a:buSzPct val="80000"/>
-              <a:buFont typeface="Wingdings 3" charset="2"/>
-              <a:buChar char=""/>
-              <a:defRPr sz="1200" b="0" i="0" kern="1200">
-                <a:solidFill>
-                  <a:schemeClr val="tx1">
-                    <a:lumMod val="75000"/>
-                    <a:lumOff val="25000"/>
-                  </a:schemeClr>
-                </a:solidFill>
-                <a:latin typeface="+mn-lt"/>
-                <a:ea typeface="+mn-ea"/>
-                <a:cs typeface="+mn-cs"/>
-              </a:defRPr>
-            </a:lvl8pPr>
-            <a:lvl9pPr marL="3886200" indent="-228600" algn="l" defTabSz="457200" rtl="0" eaLnBrk="1" latinLnBrk="0" hangingPunct="1">
-              <a:spcBef>
-                <a:spcPts val="1000"/>
-              </a:spcBef>
-              <a:spcAft>
-                <a:spcPts val="0"/>
-              </a:spcAft>
-              <a:buClr>
-                <a:schemeClr val="accent1"/>
-              </a:buClr>
-              <a:buSzPct val="80000"/>
-              <a:buFont typeface="Wingdings 3" charset="2"/>
-              <a:buChar char=""/>
-              <a:defRPr sz="1200" b="0" i="0" kern="1200">
-                <a:solidFill>
-                  <a:schemeClr val="tx1">
-                    <a:lumMod val="75000"/>
-                    <a:lumOff val="25000"/>
-                  </a:schemeClr>
-                </a:solidFill>
-                <a:latin typeface="+mn-lt"/>
-                <a:ea typeface="+mn-ea"/>
-                <a:cs typeface="+mn-cs"/>
-              </a:defRPr>
-            </a:lvl9pPr>
-          </a:lstStyle>
-          <a:p>
-            <a:endParaRPr lang="en-US" dirty="0"/>
-          </a:p>
-          <a:p>
-            <a:pPr lvl="1"/>
-            <a:endParaRPr lang="en-IN" dirty="0"/>
-          </a:p>
-        </p:txBody>
-      </p:sp>
-    </p:spTree>
-    <p:extLst>
-      <p:ext uri="{BB962C8B-B14F-4D97-AF65-F5344CB8AC3E}">
-        <p14:creationId xmlns:p14="http://schemas.microsoft.com/office/powerpoint/2010/main" val="3321783384"/>
-      </p:ext>
-    </p:extLst>
-  </p:cSld>
-  <p:clrMapOvr>
-    <a:masterClrMapping/>
-  </p:clrMapOvr>
-</p:sld>
-</file>
-
-<file path=ppt/slides/slide6.xml><?xml version="1.0" encoding="utf-8"?>
 <p:sld xmlns:a="http://schemas.openxmlformats.org/drawingml/2006/main" xmlns:r="http://schemas.openxmlformats.org/officeDocument/2006/relationships" xmlns:p="http://schemas.openxmlformats.org/presentationml/2006/main">
   <p:cSld>
     <p:spTree>

</xml_diff>